<commit_message>
Added slides for 1st meeting, update base slides
Added slide saying non-members cannot be in meetings..
</commit_message>
<xml_diff>
--- a/embedded_sig.pptx
+++ b/embedded_sig.pptx
@@ -5,14 +5,15 @@
     <p:sldMasterId id="2147483648" r:id="rId1"/>
   </p:sldMasterIdLst>
   <p:notesMasterIdLst>
-    <p:notesMasterId r:id="rId7"/>
+    <p:notesMasterId r:id="rId8"/>
   </p:notesMasterIdLst>
   <p:sldIdLst>
     <p:sldId id="257" r:id="rId2"/>
     <p:sldId id="352" r:id="rId3"/>
     <p:sldId id="353" r:id="rId4"/>
-    <p:sldId id="356" r:id="rId5"/>
-    <p:sldId id="259" r:id="rId6"/>
+    <p:sldId id="357" r:id="rId5"/>
+    <p:sldId id="356" r:id="rId6"/>
+    <p:sldId id="259" r:id="rId7"/>
   </p:sldIdLst>
   <p:sldSz cx="12192000" cy="6858000"/>
   <p:notesSz cx="6858000" cy="9144000"/>
@@ -201,7 +202,7 @@
           <a:p>
             <a:fld id="{B0F30156-4945-B44E-8D86-EEA785AD3862}" type="datetimeFigureOut">
               <a:rPr lang="en-US" smtClean="0"/>
-              <a:t>08/30/2021</a:t>
+              <a:t>09/16/2021</a:t>
             </a:fld>
             <a:endParaRPr lang="en-US"/>
           </a:p>
@@ -553,6 +554,110 @@
 </file>
 
 <file path=ppt/notesSlides/notesSlide2.xml><?xml version="1.0" encoding="utf-8"?>
+<p:notes xmlns:a="http://schemas.openxmlformats.org/drawingml/2006/main" xmlns:r="http://schemas.openxmlformats.org/officeDocument/2006/relationships" xmlns:p="http://schemas.openxmlformats.org/presentationml/2006/main" showMasterSp="0" showMasterPhAnim="0">
+  <p:cSld>
+    <p:spTree>
+      <p:nvGrpSpPr>
+        <p:cNvPr id="1" name="Shape 279"/>
+        <p:cNvGrpSpPr/>
+        <p:nvPr/>
+      </p:nvGrpSpPr>
+      <p:grpSpPr>
+        <a:xfrm>
+          <a:off x="0" y="0"/>
+          <a:ext cx="0" cy="0"/>
+          <a:chOff x="0" y="0"/>
+          <a:chExt cx="0" cy="0"/>
+        </a:xfrm>
+      </p:grpSpPr>
+      <p:sp>
+        <p:nvSpPr>
+          <p:cNvPr id="280" name="Google Shape;280;gee8baf4844_0_5:notes"/>
+          <p:cNvSpPr>
+            <a:spLocks noGrp="1" noRot="1" noChangeAspect="1"/>
+          </p:cNvSpPr>
+          <p:nvPr>
+            <p:ph type="sldImg" idx="2"/>
+          </p:nvPr>
+        </p:nvSpPr>
+        <p:spPr>
+          <a:xfrm>
+            <a:off x="381000" y="685800"/>
+            <a:ext cx="6096000" cy="3429000"/>
+          </a:xfrm>
+          <a:custGeom>
+            <a:avLst/>
+            <a:gdLst/>
+            <a:ahLst/>
+            <a:cxnLst/>
+            <a:rect l="l" t="t" r="r" b="b"/>
+            <a:pathLst>
+              <a:path w="120000" h="120000" extrusionOk="0">
+                <a:moveTo>
+                  <a:pt x="0" y="0"/>
+                </a:moveTo>
+                <a:lnTo>
+                  <a:pt x="120000" y="0"/>
+                </a:lnTo>
+                <a:lnTo>
+                  <a:pt x="120000" y="120000"/>
+                </a:lnTo>
+                <a:lnTo>
+                  <a:pt x="0" y="120000"/>
+                </a:lnTo>
+                <a:close/>
+              </a:path>
+            </a:pathLst>
+          </a:custGeom>
+        </p:spPr>
+      </p:sp>
+      <p:sp>
+        <p:nvSpPr>
+          <p:cNvPr id="281" name="Google Shape;281;gee8baf4844_0_5:notes"/>
+          <p:cNvSpPr txBox="1">
+            <a:spLocks noGrp="1"/>
+          </p:cNvSpPr>
+          <p:nvPr>
+            <p:ph type="body" idx="1"/>
+          </p:nvPr>
+        </p:nvSpPr>
+        <p:spPr>
+          <a:xfrm>
+            <a:off x="685800" y="4343400"/>
+            <a:ext cx="5486400" cy="4114800"/>
+          </a:xfrm>
+          <a:prstGeom prst="rect">
+            <a:avLst/>
+          </a:prstGeom>
+        </p:spPr>
+        <p:txBody>
+          <a:bodyPr spcFirstLastPara="1" wrap="square" lIns="91425" tIns="91425" rIns="91425" bIns="91425" anchor="t" anchorCtr="0">
+            <a:noAutofit/>
+          </a:bodyPr>
+          <a:lstStyle/>
+          <a:p>
+            <a:pPr marL="0" lvl="0" indent="0" algn="l" rtl="0">
+              <a:spcBef>
+                <a:spcPts val="0"/>
+              </a:spcBef>
+              <a:spcAft>
+                <a:spcPts val="0"/>
+              </a:spcAft>
+              <a:buNone/>
+            </a:pPr>
+            <a:endParaRPr/>
+          </a:p>
+        </p:txBody>
+      </p:sp>
+    </p:spTree>
+  </p:cSld>
+  <p:clrMapOvr>
+    <a:masterClrMapping/>
+  </p:clrMapOvr>
+</p:notes>
+</file>
+
+<file path=ppt/notesSlides/notesSlide3.xml><?xml version="1.0" encoding="utf-8"?>
 <p:notes xmlns:a="http://schemas.openxmlformats.org/drawingml/2006/main" xmlns:r="http://schemas.openxmlformats.org/officeDocument/2006/relationships" xmlns:p="http://schemas.openxmlformats.org/presentationml/2006/main">
   <p:cSld>
     <p:spTree>
@@ -617,7 +722,7 @@
           <a:p>
             <a:fld id="{D6932F46-F64A-FA4B-BE66-765633A3EF6E}" type="slidenum">
               <a:rPr lang="en-US" smtClean="0"/>
-              <a:t>5</a:t>
+              <a:t>6</a:t>
             </a:fld>
             <a:endParaRPr lang="en-US"/>
           </a:p>
@@ -783,7 +888,7 @@
           <a:p>
             <a:fld id="{EFB9A08B-59D4-334C-8D95-E3FD54A70B12}" type="datetimeFigureOut">
               <a:rPr lang="en-US" smtClean="0"/>
-              <a:t>08/30/2021</a:t>
+              <a:t>09/16/2021</a:t>
             </a:fld>
             <a:endParaRPr lang="en-US"/>
           </a:p>
@@ -981,7 +1086,7 @@
           <a:p>
             <a:fld id="{EFB9A08B-59D4-334C-8D95-E3FD54A70B12}" type="datetimeFigureOut">
               <a:rPr lang="en-US" smtClean="0"/>
-              <a:t>08/30/2021</a:t>
+              <a:t>09/16/2021</a:t>
             </a:fld>
             <a:endParaRPr lang="en-US"/>
           </a:p>
@@ -1189,7 +1294,7 @@
           <a:p>
             <a:fld id="{EFB9A08B-59D4-334C-8D95-E3FD54A70B12}" type="datetimeFigureOut">
               <a:rPr lang="en-US" smtClean="0"/>
-              <a:t>08/30/2021</a:t>
+              <a:t>09/16/2021</a:t>
             </a:fld>
             <a:endParaRPr lang="en-US"/>
           </a:p>
@@ -1253,6 +1358,783 @@
     <p:extLst>
       <p:ext uri="{BB962C8B-B14F-4D97-AF65-F5344CB8AC3E}">
         <p14:creationId xmlns:p14="http://schemas.microsoft.com/office/powerpoint/2010/main" val="1120111420"/>
+      </p:ext>
+    </p:extLst>
+  </p:cSld>
+  <p:clrMapOvr>
+    <a:masterClrMapping/>
+  </p:clrMapOvr>
+</p:sldLayout>
+</file>
+
+<file path=ppt/slideLayouts/slideLayout12.xml><?xml version="1.0" encoding="utf-8"?>
+<p:sldLayout xmlns:a="http://schemas.openxmlformats.org/drawingml/2006/main" xmlns:r="http://schemas.openxmlformats.org/officeDocument/2006/relationships" xmlns:p="http://schemas.openxmlformats.org/presentationml/2006/main" matchingName="Title and body" type="tx">
+  <p:cSld name="Title and body">
+    <p:spTree>
+      <p:nvGrpSpPr>
+        <p:cNvPr id="1" name="Shape 38"/>
+        <p:cNvGrpSpPr/>
+        <p:nvPr/>
+      </p:nvGrpSpPr>
+      <p:grpSpPr>
+        <a:xfrm>
+          <a:off x="0" y="0"/>
+          <a:ext cx="0" cy="0"/>
+          <a:chOff x="0" y="0"/>
+          <a:chExt cx="0" cy="0"/>
+        </a:xfrm>
+      </p:grpSpPr>
+      <p:sp>
+        <p:nvSpPr>
+          <p:cNvPr id="39" name="Google Shape;39;p7"/>
+          <p:cNvSpPr txBox="1">
+            <a:spLocks noGrp="1"/>
+          </p:cNvSpPr>
+          <p:nvPr>
+            <p:ph type="title"/>
+          </p:nvPr>
+        </p:nvSpPr>
+        <p:spPr>
+          <a:xfrm>
+            <a:off x="415600" y="288567"/>
+            <a:ext cx="11360800" cy="997200"/>
+          </a:xfrm>
+          <a:prstGeom prst="rect">
+            <a:avLst/>
+          </a:prstGeom>
+          <a:noFill/>
+          <a:ln>
+            <a:noFill/>
+          </a:ln>
+        </p:spPr>
+        <p:txBody>
+          <a:bodyPr spcFirstLastPara="1" wrap="square" lIns="91425" tIns="91425" rIns="91425" bIns="91425" anchor="t" anchorCtr="0">
+            <a:noAutofit/>
+          </a:bodyPr>
+          <a:lstStyle>
+            <a:lvl1pPr lvl="0" algn="l">
+              <a:lnSpc>
+                <a:spcPct val="100000"/>
+              </a:lnSpc>
+              <a:spcBef>
+                <a:spcPts val="0"/>
+              </a:spcBef>
+              <a:spcAft>
+                <a:spcPts val="0"/>
+              </a:spcAft>
+              <a:buClr>
+                <a:srgbClr val="434343"/>
+              </a:buClr>
+              <a:buSzPts val="4000"/>
+              <a:buNone/>
+              <a:defRPr>
+                <a:solidFill>
+                  <a:srgbClr val="434343"/>
+                </a:solidFill>
+              </a:defRPr>
+            </a:lvl1pPr>
+            <a:lvl2pPr lvl="1" algn="l">
+              <a:lnSpc>
+                <a:spcPct val="100000"/>
+              </a:lnSpc>
+              <a:spcBef>
+                <a:spcPts val="0"/>
+              </a:spcBef>
+              <a:spcAft>
+                <a:spcPts val="0"/>
+              </a:spcAft>
+              <a:buClr>
+                <a:srgbClr val="434343"/>
+              </a:buClr>
+              <a:buSzPts val="2400"/>
+              <a:buNone/>
+              <a:defRPr>
+                <a:solidFill>
+                  <a:srgbClr val="434343"/>
+                </a:solidFill>
+              </a:defRPr>
+            </a:lvl2pPr>
+            <a:lvl3pPr lvl="2" algn="l">
+              <a:lnSpc>
+                <a:spcPct val="100000"/>
+              </a:lnSpc>
+              <a:spcBef>
+                <a:spcPts val="0"/>
+              </a:spcBef>
+              <a:spcAft>
+                <a:spcPts val="0"/>
+              </a:spcAft>
+              <a:buClr>
+                <a:srgbClr val="434343"/>
+              </a:buClr>
+              <a:buSzPts val="2400"/>
+              <a:buNone/>
+              <a:defRPr>
+                <a:solidFill>
+                  <a:srgbClr val="434343"/>
+                </a:solidFill>
+              </a:defRPr>
+            </a:lvl3pPr>
+            <a:lvl4pPr lvl="3" algn="l">
+              <a:lnSpc>
+                <a:spcPct val="100000"/>
+              </a:lnSpc>
+              <a:spcBef>
+                <a:spcPts val="0"/>
+              </a:spcBef>
+              <a:spcAft>
+                <a:spcPts val="0"/>
+              </a:spcAft>
+              <a:buClr>
+                <a:srgbClr val="434343"/>
+              </a:buClr>
+              <a:buSzPts val="2400"/>
+              <a:buNone/>
+              <a:defRPr>
+                <a:solidFill>
+                  <a:srgbClr val="434343"/>
+                </a:solidFill>
+              </a:defRPr>
+            </a:lvl4pPr>
+            <a:lvl5pPr lvl="4" algn="l">
+              <a:lnSpc>
+                <a:spcPct val="100000"/>
+              </a:lnSpc>
+              <a:spcBef>
+                <a:spcPts val="0"/>
+              </a:spcBef>
+              <a:spcAft>
+                <a:spcPts val="0"/>
+              </a:spcAft>
+              <a:buClr>
+                <a:srgbClr val="434343"/>
+              </a:buClr>
+              <a:buSzPts val="2400"/>
+              <a:buNone/>
+              <a:defRPr>
+                <a:solidFill>
+                  <a:srgbClr val="434343"/>
+                </a:solidFill>
+              </a:defRPr>
+            </a:lvl5pPr>
+            <a:lvl6pPr lvl="5" algn="l">
+              <a:lnSpc>
+                <a:spcPct val="100000"/>
+              </a:lnSpc>
+              <a:spcBef>
+                <a:spcPts val="0"/>
+              </a:spcBef>
+              <a:spcAft>
+                <a:spcPts val="0"/>
+              </a:spcAft>
+              <a:buClr>
+                <a:srgbClr val="434343"/>
+              </a:buClr>
+              <a:buSzPts val="2400"/>
+              <a:buNone/>
+              <a:defRPr>
+                <a:solidFill>
+                  <a:srgbClr val="434343"/>
+                </a:solidFill>
+              </a:defRPr>
+            </a:lvl6pPr>
+            <a:lvl7pPr lvl="6" algn="l">
+              <a:lnSpc>
+                <a:spcPct val="100000"/>
+              </a:lnSpc>
+              <a:spcBef>
+                <a:spcPts val="0"/>
+              </a:spcBef>
+              <a:spcAft>
+                <a:spcPts val="0"/>
+              </a:spcAft>
+              <a:buClr>
+                <a:srgbClr val="434343"/>
+              </a:buClr>
+              <a:buSzPts val="2400"/>
+              <a:buNone/>
+              <a:defRPr>
+                <a:solidFill>
+                  <a:srgbClr val="434343"/>
+                </a:solidFill>
+              </a:defRPr>
+            </a:lvl7pPr>
+            <a:lvl8pPr lvl="7" algn="l">
+              <a:lnSpc>
+                <a:spcPct val="100000"/>
+              </a:lnSpc>
+              <a:spcBef>
+                <a:spcPts val="0"/>
+              </a:spcBef>
+              <a:spcAft>
+                <a:spcPts val="0"/>
+              </a:spcAft>
+              <a:buClr>
+                <a:srgbClr val="434343"/>
+              </a:buClr>
+              <a:buSzPts val="2400"/>
+              <a:buNone/>
+              <a:defRPr>
+                <a:solidFill>
+                  <a:srgbClr val="434343"/>
+                </a:solidFill>
+              </a:defRPr>
+            </a:lvl8pPr>
+            <a:lvl9pPr lvl="8" algn="l">
+              <a:lnSpc>
+                <a:spcPct val="100000"/>
+              </a:lnSpc>
+              <a:spcBef>
+                <a:spcPts val="0"/>
+              </a:spcBef>
+              <a:spcAft>
+                <a:spcPts val="0"/>
+              </a:spcAft>
+              <a:buClr>
+                <a:srgbClr val="434343"/>
+              </a:buClr>
+              <a:buSzPts val="2400"/>
+              <a:buNone/>
+              <a:defRPr>
+                <a:solidFill>
+                  <a:srgbClr val="434343"/>
+                </a:solidFill>
+              </a:defRPr>
+            </a:lvl9pPr>
+          </a:lstStyle>
+          <a:p>
+            <a:endParaRPr/>
+          </a:p>
+        </p:txBody>
+      </p:sp>
+      <p:sp>
+        <p:nvSpPr>
+          <p:cNvPr id="40" name="Google Shape;40;p7"/>
+          <p:cNvSpPr txBox="1">
+            <a:spLocks noGrp="1"/>
+          </p:cNvSpPr>
+          <p:nvPr>
+            <p:ph type="body" idx="1"/>
+          </p:nvPr>
+        </p:nvSpPr>
+        <p:spPr>
+          <a:xfrm>
+            <a:off x="415600" y="1536633"/>
+            <a:ext cx="11360800" cy="4555200"/>
+          </a:xfrm>
+          <a:prstGeom prst="rect">
+            <a:avLst/>
+          </a:prstGeom>
+          <a:noFill/>
+          <a:ln>
+            <a:noFill/>
+          </a:ln>
+        </p:spPr>
+        <p:txBody>
+          <a:bodyPr spcFirstLastPara="1" wrap="square" lIns="91425" tIns="91425" rIns="91425" bIns="91425" anchor="t" anchorCtr="0">
+            <a:noAutofit/>
+          </a:bodyPr>
+          <a:lstStyle>
+            <a:lvl1pPr marL="609585" lvl="0" indent="-457189" algn="l">
+              <a:lnSpc>
+                <a:spcPct val="115000"/>
+              </a:lnSpc>
+              <a:spcBef>
+                <a:spcPts val="0"/>
+              </a:spcBef>
+              <a:spcAft>
+                <a:spcPts val="0"/>
+              </a:spcAft>
+              <a:buSzPts val="1800"/>
+              <a:buChar char="●"/>
+              <a:defRPr/>
+            </a:lvl1pPr>
+            <a:lvl2pPr marL="1219170" lvl="1" indent="-423323" algn="l">
+              <a:lnSpc>
+                <a:spcPct val="115000"/>
+              </a:lnSpc>
+              <a:spcBef>
+                <a:spcPts val="0"/>
+              </a:spcBef>
+              <a:spcAft>
+                <a:spcPts val="0"/>
+              </a:spcAft>
+              <a:buSzPts val="1400"/>
+              <a:buChar char="○"/>
+              <a:defRPr/>
+            </a:lvl2pPr>
+            <a:lvl3pPr marL="1828754" lvl="2" indent="-423323" algn="l">
+              <a:lnSpc>
+                <a:spcPct val="115000"/>
+              </a:lnSpc>
+              <a:spcBef>
+                <a:spcPts val="0"/>
+              </a:spcBef>
+              <a:spcAft>
+                <a:spcPts val="0"/>
+              </a:spcAft>
+              <a:buSzPts val="1400"/>
+              <a:buChar char="■"/>
+              <a:defRPr/>
+            </a:lvl3pPr>
+            <a:lvl4pPr marL="2438339" lvl="3" indent="-423323" algn="l">
+              <a:lnSpc>
+                <a:spcPct val="115000"/>
+              </a:lnSpc>
+              <a:spcBef>
+                <a:spcPts val="0"/>
+              </a:spcBef>
+              <a:spcAft>
+                <a:spcPts val="0"/>
+              </a:spcAft>
+              <a:buSzPts val="1400"/>
+              <a:buChar char="●"/>
+              <a:defRPr/>
+            </a:lvl4pPr>
+            <a:lvl5pPr marL="3047924" lvl="4" indent="-423323" algn="l">
+              <a:lnSpc>
+                <a:spcPct val="115000"/>
+              </a:lnSpc>
+              <a:spcBef>
+                <a:spcPts val="0"/>
+              </a:spcBef>
+              <a:spcAft>
+                <a:spcPts val="0"/>
+              </a:spcAft>
+              <a:buSzPts val="1400"/>
+              <a:buChar char="○"/>
+              <a:defRPr/>
+            </a:lvl5pPr>
+            <a:lvl6pPr marL="3657509" lvl="5" indent="-423323" algn="l">
+              <a:lnSpc>
+                <a:spcPct val="115000"/>
+              </a:lnSpc>
+              <a:spcBef>
+                <a:spcPts val="0"/>
+              </a:spcBef>
+              <a:spcAft>
+                <a:spcPts val="0"/>
+              </a:spcAft>
+              <a:buSzPts val="1400"/>
+              <a:buChar char="■"/>
+              <a:defRPr/>
+            </a:lvl6pPr>
+            <a:lvl7pPr marL="4267093" lvl="6" indent="-423323" algn="l">
+              <a:lnSpc>
+                <a:spcPct val="115000"/>
+              </a:lnSpc>
+              <a:spcBef>
+                <a:spcPts val="0"/>
+              </a:spcBef>
+              <a:spcAft>
+                <a:spcPts val="0"/>
+              </a:spcAft>
+              <a:buSzPts val="1400"/>
+              <a:buChar char="●"/>
+              <a:defRPr/>
+            </a:lvl7pPr>
+            <a:lvl8pPr marL="4876678" lvl="7" indent="-423323" algn="l">
+              <a:lnSpc>
+                <a:spcPct val="115000"/>
+              </a:lnSpc>
+              <a:spcBef>
+                <a:spcPts val="0"/>
+              </a:spcBef>
+              <a:spcAft>
+                <a:spcPts val="0"/>
+              </a:spcAft>
+              <a:buSzPts val="1400"/>
+              <a:buChar char="○"/>
+              <a:defRPr/>
+            </a:lvl8pPr>
+            <a:lvl9pPr marL="5486263" lvl="8" indent="-423323" algn="l">
+              <a:lnSpc>
+                <a:spcPct val="115000"/>
+              </a:lnSpc>
+              <a:spcBef>
+                <a:spcPts val="0"/>
+              </a:spcBef>
+              <a:spcAft>
+                <a:spcPts val="0"/>
+              </a:spcAft>
+              <a:buSzPts val="1400"/>
+              <a:buChar char="■"/>
+              <a:defRPr/>
+            </a:lvl9pPr>
+          </a:lstStyle>
+          <a:p>
+            <a:endParaRPr/>
+          </a:p>
+        </p:txBody>
+      </p:sp>
+      <p:sp>
+        <p:nvSpPr>
+          <p:cNvPr id="41" name="Google Shape;41;p7"/>
+          <p:cNvSpPr txBox="1">
+            <a:spLocks noGrp="1"/>
+          </p:cNvSpPr>
+          <p:nvPr>
+            <p:ph type="sldNum" idx="12"/>
+          </p:nvPr>
+        </p:nvSpPr>
+        <p:spPr>
+          <a:xfrm>
+            <a:off x="11296611" y="6217623"/>
+            <a:ext cx="731600" cy="524800"/>
+          </a:xfrm>
+          <a:prstGeom prst="rect">
+            <a:avLst/>
+          </a:prstGeom>
+          <a:noFill/>
+          <a:ln>
+            <a:noFill/>
+          </a:ln>
+        </p:spPr>
+        <p:txBody>
+          <a:bodyPr spcFirstLastPara="1" wrap="square" lIns="91425" tIns="91425" rIns="91425" bIns="91425" anchor="ctr" anchorCtr="0">
+            <a:noAutofit/>
+          </a:bodyPr>
+          <a:lstStyle>
+            <a:lvl1pPr marL="0" marR="0" lvl="0" indent="0" algn="r">
+              <a:lnSpc>
+                <a:spcPct val="100000"/>
+              </a:lnSpc>
+              <a:spcBef>
+                <a:spcPts val="0"/>
+              </a:spcBef>
+              <a:spcAft>
+                <a:spcPts val="0"/>
+              </a:spcAft>
+              <a:buClr>
+                <a:srgbClr val="000000"/>
+              </a:buClr>
+              <a:buSzPts val="1000"/>
+              <a:buFont typeface="Arial"/>
+              <a:buNone/>
+              <a:defRPr sz="1333" b="0" i="0" u="none" strike="noStrike" cap="none">
+                <a:solidFill>
+                  <a:schemeClr val="dk2"/>
+                </a:solidFill>
+                <a:latin typeface="Arial"/>
+                <a:ea typeface="Arial"/>
+                <a:cs typeface="Arial"/>
+                <a:sym typeface="Arial"/>
+              </a:defRPr>
+            </a:lvl1pPr>
+            <a:lvl2pPr marL="0" marR="0" lvl="1" indent="0" algn="r">
+              <a:lnSpc>
+                <a:spcPct val="100000"/>
+              </a:lnSpc>
+              <a:spcBef>
+                <a:spcPts val="0"/>
+              </a:spcBef>
+              <a:spcAft>
+                <a:spcPts val="0"/>
+              </a:spcAft>
+              <a:buClr>
+                <a:srgbClr val="000000"/>
+              </a:buClr>
+              <a:buSzPts val="1000"/>
+              <a:buFont typeface="Arial"/>
+              <a:buNone/>
+              <a:defRPr sz="1333" b="0" i="0" u="none" strike="noStrike" cap="none">
+                <a:solidFill>
+                  <a:schemeClr val="dk2"/>
+                </a:solidFill>
+                <a:latin typeface="Arial"/>
+                <a:ea typeface="Arial"/>
+                <a:cs typeface="Arial"/>
+                <a:sym typeface="Arial"/>
+              </a:defRPr>
+            </a:lvl2pPr>
+            <a:lvl3pPr marL="0" marR="0" lvl="2" indent="0" algn="r">
+              <a:lnSpc>
+                <a:spcPct val="100000"/>
+              </a:lnSpc>
+              <a:spcBef>
+                <a:spcPts val="0"/>
+              </a:spcBef>
+              <a:spcAft>
+                <a:spcPts val="0"/>
+              </a:spcAft>
+              <a:buClr>
+                <a:srgbClr val="000000"/>
+              </a:buClr>
+              <a:buSzPts val="1000"/>
+              <a:buFont typeface="Arial"/>
+              <a:buNone/>
+              <a:defRPr sz="1333" b="0" i="0" u="none" strike="noStrike" cap="none">
+                <a:solidFill>
+                  <a:schemeClr val="dk2"/>
+                </a:solidFill>
+                <a:latin typeface="Arial"/>
+                <a:ea typeface="Arial"/>
+                <a:cs typeface="Arial"/>
+                <a:sym typeface="Arial"/>
+              </a:defRPr>
+            </a:lvl3pPr>
+            <a:lvl4pPr marL="0" marR="0" lvl="3" indent="0" algn="r">
+              <a:lnSpc>
+                <a:spcPct val="100000"/>
+              </a:lnSpc>
+              <a:spcBef>
+                <a:spcPts val="0"/>
+              </a:spcBef>
+              <a:spcAft>
+                <a:spcPts val="0"/>
+              </a:spcAft>
+              <a:buClr>
+                <a:srgbClr val="000000"/>
+              </a:buClr>
+              <a:buSzPts val="1000"/>
+              <a:buFont typeface="Arial"/>
+              <a:buNone/>
+              <a:defRPr sz="1333" b="0" i="0" u="none" strike="noStrike" cap="none">
+                <a:solidFill>
+                  <a:schemeClr val="dk2"/>
+                </a:solidFill>
+                <a:latin typeface="Arial"/>
+                <a:ea typeface="Arial"/>
+                <a:cs typeface="Arial"/>
+                <a:sym typeface="Arial"/>
+              </a:defRPr>
+            </a:lvl4pPr>
+            <a:lvl5pPr marL="0" marR="0" lvl="4" indent="0" algn="r">
+              <a:lnSpc>
+                <a:spcPct val="100000"/>
+              </a:lnSpc>
+              <a:spcBef>
+                <a:spcPts val="0"/>
+              </a:spcBef>
+              <a:spcAft>
+                <a:spcPts val="0"/>
+              </a:spcAft>
+              <a:buClr>
+                <a:srgbClr val="000000"/>
+              </a:buClr>
+              <a:buSzPts val="1000"/>
+              <a:buFont typeface="Arial"/>
+              <a:buNone/>
+              <a:defRPr sz="1333" b="0" i="0" u="none" strike="noStrike" cap="none">
+                <a:solidFill>
+                  <a:schemeClr val="dk2"/>
+                </a:solidFill>
+                <a:latin typeface="Arial"/>
+                <a:ea typeface="Arial"/>
+                <a:cs typeface="Arial"/>
+                <a:sym typeface="Arial"/>
+              </a:defRPr>
+            </a:lvl5pPr>
+            <a:lvl6pPr marL="0" marR="0" lvl="5" indent="0" algn="r">
+              <a:lnSpc>
+                <a:spcPct val="100000"/>
+              </a:lnSpc>
+              <a:spcBef>
+                <a:spcPts val="0"/>
+              </a:spcBef>
+              <a:spcAft>
+                <a:spcPts val="0"/>
+              </a:spcAft>
+              <a:buClr>
+                <a:srgbClr val="000000"/>
+              </a:buClr>
+              <a:buSzPts val="1000"/>
+              <a:buFont typeface="Arial"/>
+              <a:buNone/>
+              <a:defRPr sz="1333" b="0" i="0" u="none" strike="noStrike" cap="none">
+                <a:solidFill>
+                  <a:schemeClr val="dk2"/>
+                </a:solidFill>
+                <a:latin typeface="Arial"/>
+                <a:ea typeface="Arial"/>
+                <a:cs typeface="Arial"/>
+                <a:sym typeface="Arial"/>
+              </a:defRPr>
+            </a:lvl6pPr>
+            <a:lvl7pPr marL="0" marR="0" lvl="6" indent="0" algn="r">
+              <a:lnSpc>
+                <a:spcPct val="100000"/>
+              </a:lnSpc>
+              <a:spcBef>
+                <a:spcPts val="0"/>
+              </a:spcBef>
+              <a:spcAft>
+                <a:spcPts val="0"/>
+              </a:spcAft>
+              <a:buClr>
+                <a:srgbClr val="000000"/>
+              </a:buClr>
+              <a:buSzPts val="1000"/>
+              <a:buFont typeface="Arial"/>
+              <a:buNone/>
+              <a:defRPr sz="1333" b="0" i="0" u="none" strike="noStrike" cap="none">
+                <a:solidFill>
+                  <a:schemeClr val="dk2"/>
+                </a:solidFill>
+                <a:latin typeface="Arial"/>
+                <a:ea typeface="Arial"/>
+                <a:cs typeface="Arial"/>
+                <a:sym typeface="Arial"/>
+              </a:defRPr>
+            </a:lvl7pPr>
+            <a:lvl8pPr marL="0" marR="0" lvl="7" indent="0" algn="r">
+              <a:lnSpc>
+                <a:spcPct val="100000"/>
+              </a:lnSpc>
+              <a:spcBef>
+                <a:spcPts val="0"/>
+              </a:spcBef>
+              <a:spcAft>
+                <a:spcPts val="0"/>
+              </a:spcAft>
+              <a:buClr>
+                <a:srgbClr val="000000"/>
+              </a:buClr>
+              <a:buSzPts val="1000"/>
+              <a:buFont typeface="Arial"/>
+              <a:buNone/>
+              <a:defRPr sz="1333" b="0" i="0" u="none" strike="noStrike" cap="none">
+                <a:solidFill>
+                  <a:schemeClr val="dk2"/>
+                </a:solidFill>
+                <a:latin typeface="Arial"/>
+                <a:ea typeface="Arial"/>
+                <a:cs typeface="Arial"/>
+                <a:sym typeface="Arial"/>
+              </a:defRPr>
+            </a:lvl8pPr>
+            <a:lvl9pPr marL="0" marR="0" lvl="8" indent="0" algn="r">
+              <a:lnSpc>
+                <a:spcPct val="100000"/>
+              </a:lnSpc>
+              <a:spcBef>
+                <a:spcPts val="0"/>
+              </a:spcBef>
+              <a:spcAft>
+                <a:spcPts val="0"/>
+              </a:spcAft>
+              <a:buClr>
+                <a:srgbClr val="000000"/>
+              </a:buClr>
+              <a:buSzPts val="1000"/>
+              <a:buFont typeface="Arial"/>
+              <a:buNone/>
+              <a:defRPr sz="1333" b="0" i="0" u="none" strike="noStrike" cap="none">
+                <a:solidFill>
+                  <a:schemeClr val="dk2"/>
+                </a:solidFill>
+                <a:latin typeface="Arial"/>
+                <a:ea typeface="Arial"/>
+                <a:cs typeface="Arial"/>
+                <a:sym typeface="Arial"/>
+              </a:defRPr>
+            </a:lvl9pPr>
+          </a:lstStyle>
+          <a:p>
+            <a:fld id="{00000000-1234-1234-1234-123412341234}" type="slidenum">
+              <a:rPr lang="en" smtClean="0"/>
+              <a:pPr/>
+              <a:t>‹#›</a:t>
+            </a:fld>
+            <a:endParaRPr lang="en"/>
+          </a:p>
+        </p:txBody>
+      </p:sp>
+      <p:sp>
+        <p:nvSpPr>
+          <p:cNvPr id="42" name="Google Shape;42;p7"/>
+          <p:cNvSpPr/>
+          <p:nvPr/>
+        </p:nvSpPr>
+        <p:spPr>
+          <a:xfrm>
+            <a:off x="0" y="0"/>
+            <a:ext cx="12192000" cy="137200"/>
+          </a:xfrm>
+          <a:prstGeom prst="rect">
+            <a:avLst/>
+          </a:prstGeom>
+          <a:gradFill>
+            <a:gsLst>
+              <a:gs pos="0">
+                <a:srgbClr val="0A3799"/>
+              </a:gs>
+              <a:gs pos="100000">
+                <a:srgbClr val="0A6B7C"/>
+              </a:gs>
+            </a:gsLst>
+            <a:lin ang="0" scaled="0"/>
+          </a:gradFill>
+          <a:ln>
+            <a:noFill/>
+          </a:ln>
+        </p:spPr>
+        <p:txBody>
+          <a:bodyPr spcFirstLastPara="1" wrap="square" lIns="121900" tIns="121900" rIns="121900" bIns="121900" anchor="ctr" anchorCtr="0">
+            <a:noAutofit/>
+          </a:bodyPr>
+          <a:lstStyle/>
+          <a:p>
+            <a:pPr marL="0" marR="0" lvl="0" indent="0" algn="l" rtl="0">
+              <a:lnSpc>
+                <a:spcPct val="100000"/>
+              </a:lnSpc>
+              <a:spcBef>
+                <a:spcPts val="0"/>
+              </a:spcBef>
+              <a:spcAft>
+                <a:spcPts val="0"/>
+              </a:spcAft>
+              <a:buClr>
+                <a:srgbClr val="000000"/>
+              </a:buClr>
+              <a:buSzPts val="1400"/>
+              <a:buFont typeface="Arial"/>
+              <a:buNone/>
+            </a:pPr>
+            <a:endParaRPr sz="1867" b="0" i="0" u="none" strike="noStrike" cap="none">
+              <a:solidFill>
+                <a:srgbClr val="000000"/>
+              </a:solidFill>
+              <a:latin typeface="Arial"/>
+              <a:ea typeface="Arial"/>
+              <a:cs typeface="Arial"/>
+              <a:sym typeface="Arial"/>
+            </a:endParaRPr>
+          </a:p>
+        </p:txBody>
+      </p:sp>
+      <p:pic>
+        <p:nvPicPr>
+          <p:cNvPr id="43" name="Google Shape;43;p7"/>
+          <p:cNvPicPr preferRelativeResize="0"/>
+          <p:nvPr/>
+        </p:nvPicPr>
+        <p:blipFill rotWithShape="1">
+          <a:blip r:embed="rId2">
+            <a:alphaModFix/>
+          </a:blip>
+          <a:srcRect/>
+          <a:stretch/>
+        </p:blipFill>
+        <p:spPr>
+          <a:xfrm>
+            <a:off x="241601" y="6325095"/>
+            <a:ext cx="1947535" cy="309900"/>
+          </a:xfrm>
+          <a:prstGeom prst="rect">
+            <a:avLst/>
+          </a:prstGeom>
+          <a:noFill/>
+          <a:ln>
+            <a:noFill/>
+          </a:ln>
+        </p:spPr>
+      </p:pic>
+    </p:spTree>
+    <p:extLst>
+      <p:ext uri="{BB962C8B-B14F-4D97-AF65-F5344CB8AC3E}">
+        <p14:creationId xmlns:p14="http://schemas.microsoft.com/office/powerpoint/2010/main" val="3605745067"/>
       </p:ext>
     </p:extLst>
   </p:cSld>
@@ -1387,7 +2269,7 @@
           <a:p>
             <a:fld id="{EFB9A08B-59D4-334C-8D95-E3FD54A70B12}" type="datetimeFigureOut">
               <a:rPr lang="en-US" smtClean="0"/>
-              <a:t>08/30/2021</a:t>
+              <a:t>09/16/2021</a:t>
             </a:fld>
             <a:endParaRPr lang="en-US"/>
           </a:p>
@@ -1662,7 +2544,7 @@
           <a:p>
             <a:fld id="{EFB9A08B-59D4-334C-8D95-E3FD54A70B12}" type="datetimeFigureOut">
               <a:rPr lang="en-US" smtClean="0"/>
-              <a:t>08/30/2021</a:t>
+              <a:t>09/16/2021</a:t>
             </a:fld>
             <a:endParaRPr lang="en-US"/>
           </a:p>
@@ -1927,7 +2809,7 @@
           <a:p>
             <a:fld id="{EFB9A08B-59D4-334C-8D95-E3FD54A70B12}" type="datetimeFigureOut">
               <a:rPr lang="en-US" smtClean="0"/>
-              <a:t>08/30/2021</a:t>
+              <a:t>09/16/2021</a:t>
             </a:fld>
             <a:endParaRPr lang="en-US"/>
           </a:p>
@@ -2339,7 +3221,7 @@
           <a:p>
             <a:fld id="{EFB9A08B-59D4-334C-8D95-E3FD54A70B12}" type="datetimeFigureOut">
               <a:rPr lang="en-US" smtClean="0"/>
-              <a:t>08/30/2021</a:t>
+              <a:t>09/16/2021</a:t>
             </a:fld>
             <a:endParaRPr lang="en-US"/>
           </a:p>
@@ -2480,7 +3362,7 @@
           <a:p>
             <a:fld id="{EFB9A08B-59D4-334C-8D95-E3FD54A70B12}" type="datetimeFigureOut">
               <a:rPr lang="en-US" smtClean="0"/>
-              <a:t>08/30/2021</a:t>
+              <a:t>09/16/2021</a:t>
             </a:fld>
             <a:endParaRPr lang="en-US"/>
           </a:p>
@@ -2593,7 +3475,7 @@
           <a:p>
             <a:fld id="{EFB9A08B-59D4-334C-8D95-E3FD54A70B12}" type="datetimeFigureOut">
               <a:rPr lang="en-US" smtClean="0"/>
-              <a:t>08/30/2021</a:t>
+              <a:t>09/16/2021</a:t>
             </a:fld>
             <a:endParaRPr lang="en-US"/>
           </a:p>
@@ -2904,7 +3786,7 @@
           <a:p>
             <a:fld id="{EFB9A08B-59D4-334C-8D95-E3FD54A70B12}" type="datetimeFigureOut">
               <a:rPr lang="en-US" smtClean="0"/>
-              <a:t>08/30/2021</a:t>
+              <a:t>09/16/2021</a:t>
             </a:fld>
             <a:endParaRPr lang="en-US"/>
           </a:p>
@@ -3192,7 +4074,7 @@
           <a:p>
             <a:fld id="{EFB9A08B-59D4-334C-8D95-E3FD54A70B12}" type="datetimeFigureOut">
               <a:rPr lang="en-US" smtClean="0"/>
-              <a:t>08/30/2021</a:t>
+              <a:t>09/16/2021</a:t>
             </a:fld>
             <a:endParaRPr lang="en-US"/>
           </a:p>
@@ -3433,7 +4315,7 @@
           <a:p>
             <a:fld id="{EFB9A08B-59D4-334C-8D95-E3FD54A70B12}" type="datetimeFigureOut">
               <a:rPr lang="en-US" smtClean="0"/>
-              <a:t>08/30/2021</a:t>
+              <a:t>09/16/2021</a:t>
             </a:fld>
             <a:endParaRPr lang="en-US"/>
           </a:p>
@@ -3549,6 +4431,7 @@
     <p:sldLayoutId id="2147483657" r:id="rId9"/>
     <p:sldLayoutId id="2147483658" r:id="rId10"/>
     <p:sldLayoutId id="2147483659" r:id="rId11"/>
+    <p:sldLayoutId id="2147483660" r:id="rId12"/>
   </p:sldLayoutIdLst>
   <p:txStyles>
     <p:titleStyle>
@@ -4366,6 +5249,104 @@
   <p:cSld>
     <p:spTree>
       <p:nvGrpSpPr>
+        <p:cNvPr id="1" name="Shape 282"/>
+        <p:cNvGrpSpPr/>
+        <p:nvPr/>
+      </p:nvGrpSpPr>
+      <p:grpSpPr>
+        <a:xfrm>
+          <a:off x="0" y="0"/>
+          <a:ext cx="0" cy="0"/>
+          <a:chOff x="0" y="0"/>
+          <a:chExt cx="0" cy="0"/>
+        </a:xfrm>
+      </p:grpSpPr>
+      <p:sp>
+        <p:nvSpPr>
+          <p:cNvPr id="283" name="Google Shape;283;p47"/>
+          <p:cNvSpPr txBox="1">
+            <a:spLocks noGrp="1"/>
+          </p:cNvSpPr>
+          <p:nvPr>
+            <p:ph type="title"/>
+          </p:nvPr>
+        </p:nvSpPr>
+        <p:spPr>
+          <a:xfrm>
+            <a:off x="415600" y="288567"/>
+            <a:ext cx="11360800" cy="997200"/>
+          </a:xfrm>
+          <a:prstGeom prst="rect">
+            <a:avLst/>
+          </a:prstGeom>
+        </p:spPr>
+        <p:txBody>
+          <a:bodyPr spcFirstLastPara="1" vert="horz" wrap="square" lIns="121900" tIns="121900" rIns="121900" bIns="121900" rtlCol="0" anchor="t" anchorCtr="0">
+            <a:noAutofit/>
+          </a:bodyPr>
+          <a:lstStyle/>
+          <a:p>
+            <a:r>
+              <a:rPr lang="en"/>
+              <a:t>Only RISC-V Members May Attend</a:t>
+            </a:r>
+            <a:endParaRPr/>
+          </a:p>
+        </p:txBody>
+      </p:sp>
+      <p:sp>
+        <p:nvSpPr>
+          <p:cNvPr id="284" name="Google Shape;284;p47"/>
+          <p:cNvSpPr txBox="1">
+            <a:spLocks noGrp="1"/>
+          </p:cNvSpPr>
+          <p:nvPr>
+            <p:ph type="body" idx="1"/>
+          </p:nvPr>
+        </p:nvSpPr>
+        <p:spPr>
+          <a:xfrm>
+            <a:off x="415600" y="1536633"/>
+            <a:ext cx="11360800" cy="4555200"/>
+          </a:xfrm>
+          <a:prstGeom prst="rect">
+            <a:avLst/>
+          </a:prstGeom>
+        </p:spPr>
+        <p:txBody>
+          <a:bodyPr spcFirstLastPara="1" vert="horz" wrap="square" lIns="121900" tIns="121900" rIns="121900" bIns="121900" rtlCol="0" anchor="t" anchorCtr="0">
+            <a:noAutofit/>
+          </a:bodyPr>
+          <a:lstStyle/>
+          <a:p>
+            <a:r>
+              <a:rPr lang="en" dirty="0"/>
+              <a:t>It is easy to become a member. Check out riscv.org</a:t>
+            </a:r>
+            <a:endParaRPr dirty="0"/>
+          </a:p>
+          <a:p>
+            <a:r>
+              <a:rPr lang="en"/>
+              <a:t>If you need work done between non-members or other orgs and RISC-V, we will use a joint working group.</a:t>
+            </a:r>
+            <a:endParaRPr lang="en" dirty="0"/>
+          </a:p>
+        </p:txBody>
+      </p:sp>
+    </p:spTree>
+  </p:cSld>
+  <p:clrMapOvr>
+    <a:masterClrMapping/>
+  </p:clrMapOvr>
+</p:sld>
+</file>
+
+<file path=ppt/slides/slide5.xml><?xml version="1.0" encoding="utf-8"?>
+<p:sld xmlns:a="http://schemas.openxmlformats.org/drawingml/2006/main" xmlns:r="http://schemas.openxmlformats.org/officeDocument/2006/relationships" xmlns:p="http://schemas.openxmlformats.org/presentationml/2006/main">
+  <p:cSld>
+    <p:spTree>
+      <p:nvGrpSpPr>
         <p:cNvPr id="1" name=""/>
         <p:cNvGrpSpPr/>
         <p:nvPr/>
@@ -4649,7 +5630,7 @@
 </p:sld>
 </file>
 
-<file path=ppt/slides/slide5.xml><?xml version="1.0" encoding="utf-8"?>
+<file path=ppt/slides/slide6.xml><?xml version="1.0" encoding="utf-8"?>
 <p:sld xmlns:a="http://schemas.openxmlformats.org/drawingml/2006/main" xmlns:r="http://schemas.openxmlformats.org/officeDocument/2006/relationships" xmlns:p="http://schemas.openxmlformats.org/presentationml/2006/main">
   <p:cSld>
     <p:spTree>

</xml_diff>